<commit_message>
jetty server to 11.0.11 ipv +
</commit_message>
<xml_diff>
--- a/Sogyo IP.pptx
+++ b/Sogyo IP.pptx
@@ -9,7 +9,8 @@
     <p:sldId id="257" r:id="rId3"/>
     <p:sldId id="258" r:id="rId4"/>
     <p:sldId id="259" r:id="rId5"/>
-    <p:sldId id="260" r:id="rId6"/>
+    <p:sldId id="261" r:id="rId6"/>
+    <p:sldId id="260" r:id="rId7"/>
   </p:sldIdLst>
   <p:sldSz cx="12192000" cy="6858000"/>
   <p:notesSz cx="6858000" cy="9144000"/>
@@ -108,6 +109,11 @@
       </a:defRPr>
     </a:lvl9pPr>
   </p:defaultTextStyle>
+  <p:extLst>
+    <p:ext uri="{EFAFB233-063F-42B5-8137-9DF3F51BA10A}">
+      <p15:sldGuideLst xmlns:p15="http://schemas.microsoft.com/office/powerpoint/2012/main"/>
+    </p:ext>
+  </p:extLst>
 </p:presentation>
 </file>
 
@@ -260,7 +266,7 @@
           <a:p>
             <a:fld id="{A5FFDBC9-F609-4A1F-BA6B-AF6FF0C437E2}" type="datetimeFigureOut">
               <a:rPr lang="en-GB" smtClean="0"/>
-              <a:t>29/07/2022</a:t>
+              <a:t>07/09/2022</a:t>
             </a:fld>
             <a:endParaRPr lang="en-GB"/>
           </a:p>
@@ -460,7 +466,7 @@
           <a:p>
             <a:fld id="{A5FFDBC9-F609-4A1F-BA6B-AF6FF0C437E2}" type="datetimeFigureOut">
               <a:rPr lang="en-GB" smtClean="0"/>
-              <a:t>29/07/2022</a:t>
+              <a:t>07/09/2022</a:t>
             </a:fld>
             <a:endParaRPr lang="en-GB"/>
           </a:p>
@@ -670,7 +676,7 @@
           <a:p>
             <a:fld id="{A5FFDBC9-F609-4A1F-BA6B-AF6FF0C437E2}" type="datetimeFigureOut">
               <a:rPr lang="en-GB" smtClean="0"/>
-              <a:t>29/07/2022</a:t>
+              <a:t>07/09/2022</a:t>
             </a:fld>
             <a:endParaRPr lang="en-GB"/>
           </a:p>
@@ -870,7 +876,7 @@
           <a:p>
             <a:fld id="{A5FFDBC9-F609-4A1F-BA6B-AF6FF0C437E2}" type="datetimeFigureOut">
               <a:rPr lang="en-GB" smtClean="0"/>
-              <a:t>29/07/2022</a:t>
+              <a:t>07/09/2022</a:t>
             </a:fld>
             <a:endParaRPr lang="en-GB"/>
           </a:p>
@@ -1146,7 +1152,7 @@
           <a:p>
             <a:fld id="{A5FFDBC9-F609-4A1F-BA6B-AF6FF0C437E2}" type="datetimeFigureOut">
               <a:rPr lang="en-GB" smtClean="0"/>
-              <a:t>29/07/2022</a:t>
+              <a:t>07/09/2022</a:t>
             </a:fld>
             <a:endParaRPr lang="en-GB"/>
           </a:p>
@@ -1414,7 +1420,7 @@
           <a:p>
             <a:fld id="{A5FFDBC9-F609-4A1F-BA6B-AF6FF0C437E2}" type="datetimeFigureOut">
               <a:rPr lang="en-GB" smtClean="0"/>
-              <a:t>29/07/2022</a:t>
+              <a:t>07/09/2022</a:t>
             </a:fld>
             <a:endParaRPr lang="en-GB"/>
           </a:p>
@@ -1829,7 +1835,7 @@
           <a:p>
             <a:fld id="{A5FFDBC9-F609-4A1F-BA6B-AF6FF0C437E2}" type="datetimeFigureOut">
               <a:rPr lang="en-GB" smtClean="0"/>
-              <a:t>29/07/2022</a:t>
+              <a:t>07/09/2022</a:t>
             </a:fld>
             <a:endParaRPr lang="en-GB"/>
           </a:p>
@@ -1971,7 +1977,7 @@
           <a:p>
             <a:fld id="{A5FFDBC9-F609-4A1F-BA6B-AF6FF0C437E2}" type="datetimeFigureOut">
               <a:rPr lang="en-GB" smtClean="0"/>
-              <a:t>29/07/2022</a:t>
+              <a:t>07/09/2022</a:t>
             </a:fld>
             <a:endParaRPr lang="en-GB"/>
           </a:p>
@@ -2084,7 +2090,7 @@
           <a:p>
             <a:fld id="{A5FFDBC9-F609-4A1F-BA6B-AF6FF0C437E2}" type="datetimeFigureOut">
               <a:rPr lang="en-GB" smtClean="0"/>
-              <a:t>29/07/2022</a:t>
+              <a:t>07/09/2022</a:t>
             </a:fld>
             <a:endParaRPr lang="en-GB"/>
           </a:p>
@@ -2397,7 +2403,7 @@
           <a:p>
             <a:fld id="{A5FFDBC9-F609-4A1F-BA6B-AF6FF0C437E2}" type="datetimeFigureOut">
               <a:rPr lang="en-GB" smtClean="0"/>
-              <a:t>29/07/2022</a:t>
+              <a:t>07/09/2022</a:t>
             </a:fld>
             <a:endParaRPr lang="en-GB"/>
           </a:p>
@@ -2686,7 +2692,7 @@
           <a:p>
             <a:fld id="{A5FFDBC9-F609-4A1F-BA6B-AF6FF0C437E2}" type="datetimeFigureOut">
               <a:rPr lang="en-GB" smtClean="0"/>
-              <a:t>29/07/2022</a:t>
+              <a:t>07/09/2022</a:t>
             </a:fld>
             <a:endParaRPr lang="en-GB"/>
           </a:p>
@@ -2929,7 +2935,7 @@
           <a:p>
             <a:fld id="{A5FFDBC9-F609-4A1F-BA6B-AF6FF0C437E2}" type="datetimeFigureOut">
               <a:rPr lang="en-GB" smtClean="0"/>
-              <a:t>29/07/2022</a:t>
+              <a:t>07/09/2022</a:t>
             </a:fld>
             <a:endParaRPr lang="en-GB"/>
           </a:p>
@@ -3368,12 +3374,8 @@
           <a:lstStyle/>
           <a:p>
             <a:r>
-              <a:rPr lang="nl-NL" dirty="0" err="1"/>
-              <a:t>Sogyo</a:t>
-            </a:r>
-            <a:r>
               <a:rPr lang="nl-NL" dirty="0"/>
-              <a:t> IP</a:t>
+              <a:t>Escape Room</a:t>
             </a:r>
             <a:endParaRPr lang="en-GB" dirty="0"/>
           </a:p>
@@ -3395,12 +3397,38 @@
             <p:ph type="subTitle" idx="1"/>
           </p:nvPr>
         </p:nvSpPr>
-        <p:spPr/>
-        <p:txBody>
-          <a:bodyPr/>
-          <a:lstStyle/>
-          <a:p>
-            <a:endParaRPr lang="en-GB" dirty="0"/>
+        <p:spPr>
+          <a:xfrm>
+            <a:off x="1524000" y="4339086"/>
+            <a:ext cx="9144000" cy="1641925"/>
+          </a:xfrm>
+        </p:spPr>
+        <p:txBody>
+          <a:bodyPr>
+            <a:normAutofit/>
+          </a:bodyPr>
+          <a:lstStyle/>
+          <a:p>
+            <a:pPr algn="l"/>
+            <a:r>
+              <a:rPr lang="nl-NL" sz="2000" dirty="0"/>
+              <a:t>Individueel project</a:t>
+            </a:r>
+          </a:p>
+          <a:p>
+            <a:pPr algn="l"/>
+            <a:r>
+              <a:rPr lang="nl-NL" sz="2000" dirty="0"/>
+              <a:t>Floor Wieringa</a:t>
+            </a:r>
+          </a:p>
+          <a:p>
+            <a:pPr algn="l"/>
+            <a:r>
+              <a:rPr lang="nl-NL" sz="2000" dirty="0"/>
+              <a:t>8-9-2022</a:t>
+            </a:r>
+            <a:endParaRPr lang="en-GB" sz="2000" dirty="0"/>
           </a:p>
         </p:txBody>
       </p:sp>
@@ -3497,7 +3525,7 @@
           <a:p>
             <a:r>
               <a:rPr lang="nl-NL" dirty="0"/>
-              <a:t>Tekst-</a:t>
+              <a:t>Text-</a:t>
             </a:r>
             <a:r>
               <a:rPr lang="nl-NL" dirty="0" err="1"/>
@@ -3666,14 +3694,15 @@
           <a:p>
             <a:r>
               <a:rPr lang="nl-NL" dirty="0"/>
-              <a:t>Architecture</a:t>
-            </a:r>
-            <a:br>
+              <a:t>Architecture (</a:t>
+            </a:r>
+            <a:r>
+              <a:rPr lang="nl-NL" dirty="0" err="1"/>
+              <a:t>React</a:t>
+            </a:r>
+            <a:r>
               <a:rPr lang="nl-NL" dirty="0"/>
-            </a:br>
-            <a:r>
-              <a:rPr lang="nl-NL" sz="2800" dirty="0"/>
-              <a:t>Ft. zeemeermin</a:t>
+              <a:t>)</a:t>
             </a:r>
             <a:endParaRPr lang="en-GB" dirty="0"/>
           </a:p>
@@ -3982,6 +4011,105 @@
           <p:cNvPr id="2" name="Titel 1">
             <a:extLst>
               <a:ext uri="{FF2B5EF4-FFF2-40B4-BE49-F238E27FC236}">
+                <a16:creationId xmlns:a16="http://schemas.microsoft.com/office/drawing/2014/main" id="{4F326DCB-C81A-C1EC-23E2-C4E63C11C91E}"/>
+              </a:ext>
+            </a:extLst>
+          </p:cNvPr>
+          <p:cNvSpPr>
+            <a:spLocks noGrp="1"/>
+          </p:cNvSpPr>
+          <p:nvPr>
+            <p:ph type="title"/>
+          </p:nvPr>
+        </p:nvSpPr>
+        <p:spPr/>
+        <p:txBody>
+          <a:bodyPr/>
+          <a:lstStyle/>
+          <a:p>
+            <a:r>
+              <a:rPr lang="nl-NL" dirty="0"/>
+              <a:t>To-do’s</a:t>
+            </a:r>
+            <a:endParaRPr lang="en-GB" dirty="0"/>
+          </a:p>
+        </p:txBody>
+      </p:sp>
+      <p:sp>
+        <p:nvSpPr>
+          <p:cNvPr id="3" name="Tijdelijke aanduiding voor inhoud 2">
+            <a:extLst>
+              <a:ext uri="{FF2B5EF4-FFF2-40B4-BE49-F238E27FC236}">
+                <a16:creationId xmlns:a16="http://schemas.microsoft.com/office/drawing/2014/main" id="{7970BE3A-FC28-7C41-5524-26A314DEA344}"/>
+              </a:ext>
+            </a:extLst>
+          </p:cNvPr>
+          <p:cNvSpPr>
+            <a:spLocks noGrp="1"/>
+          </p:cNvSpPr>
+          <p:nvPr>
+            <p:ph idx="1"/>
+          </p:nvPr>
+        </p:nvSpPr>
+        <p:spPr/>
+        <p:txBody>
+          <a:bodyPr/>
+          <a:lstStyle/>
+          <a:p>
+            <a:r>
+              <a:rPr lang="nl-NL" dirty="0"/>
+              <a:t>Mobile view</a:t>
+            </a:r>
+          </a:p>
+          <a:p>
+            <a:r>
+              <a:rPr lang="en-GB" dirty="0"/>
+              <a:t>Aesthetics</a:t>
+            </a:r>
+          </a:p>
+          <a:p>
+            <a:r>
+              <a:rPr lang="en-GB" dirty="0"/>
+              <a:t>Inventory system more visually intuitive</a:t>
+            </a:r>
+          </a:p>
+        </p:txBody>
+      </p:sp>
+    </p:spTree>
+    <p:extLst>
+      <p:ext uri="{BB962C8B-B14F-4D97-AF65-F5344CB8AC3E}">
+        <p14:creationId xmlns:p14="http://schemas.microsoft.com/office/powerpoint/2010/main" val="244939989"/>
+      </p:ext>
+    </p:extLst>
+  </p:cSld>
+  <p:clrMapOvr>
+    <a:masterClrMapping/>
+  </p:clrMapOvr>
+</p:sld>
+</file>
+
+<file path=ppt/slides/slide6.xml><?xml version="1.0" encoding="utf-8"?>
+<p:sld xmlns:a="http://schemas.openxmlformats.org/drawingml/2006/main" xmlns:r="http://schemas.openxmlformats.org/officeDocument/2006/relationships" xmlns:p="http://schemas.openxmlformats.org/presentationml/2006/main">
+  <p:cSld>
+    <p:spTree>
+      <p:nvGrpSpPr>
+        <p:cNvPr id="1" name=""/>
+        <p:cNvGrpSpPr/>
+        <p:nvPr/>
+      </p:nvGrpSpPr>
+      <p:grpSpPr>
+        <a:xfrm>
+          <a:off x="0" y="0"/>
+          <a:ext cx="0" cy="0"/>
+          <a:chOff x="0" y="0"/>
+          <a:chExt cx="0" cy="0"/>
+        </a:xfrm>
+      </p:grpSpPr>
+      <p:sp>
+        <p:nvSpPr>
+          <p:cNvPr id="2" name="Titel 1">
+            <a:extLst>
+              <a:ext uri="{FF2B5EF4-FFF2-40B4-BE49-F238E27FC236}">
                 <a16:creationId xmlns:a16="http://schemas.microsoft.com/office/drawing/2014/main" id="{874524AE-EAC0-9667-FC9C-AE1CD557831C}"/>
               </a:ext>
             </a:extLst>
@@ -4000,7 +4128,7 @@
           <a:p>
             <a:r>
               <a:rPr lang="nl-NL" dirty="0"/>
-              <a:t>Showcase!! </a:t>
+              <a:t>The product</a:t>
             </a:r>
             <a:endParaRPr lang="en-GB" dirty="0"/>
           </a:p>

</xml_diff>